<commit_message>
update PPT and slides, replacing "django" with "flask"
</commit_message>
<xml_diff>
--- a/media/LEP-introduction.pptx
+++ b/media/LEP-introduction.pptx
@@ -1,6 +1,6 @@
 
 <file path=ppt/presentation.xml><?xml version="1.0" encoding="utf-8"?>
-<p:presentation xmlns:a="http://schemas.openxmlformats.org/drawingml/2006/main" xmlns:r="http://schemas.openxmlformats.org/officeDocument/2006/relationships" xmlns:p="http://schemas.openxmlformats.org/presentationml/2006/main">
+<p:presentation xmlns:a="http://schemas.openxmlformats.org/drawingml/2006/main" xmlns:r="http://schemas.openxmlformats.org/officeDocument/2006/relationships" xmlns:p="http://schemas.openxmlformats.org/presentationml/2006/main" saveSubsetFonts="1">
   <p:sldMasterIdLst>
     <p:sldMasterId id="2147483648" r:id="rId1"/>
     <p:sldMasterId id="2147483652" r:id="rId2"/>
@@ -216,7 +216,7 @@
   </p:defaultTextStyle>
   <p:extLst>
     <p:ext uri="{EFAFB233-063F-42B5-8137-9DF3F51BA10A}">
-      <p15:sldGuideLst xmlns="" xmlns:p15="http://schemas.microsoft.com/office/powerpoint/2012/main">
+      <p15:sldGuideLst xmlns:p15="http://schemas.microsoft.com/office/powerpoint/2012/main">
         <p15:guide id="1" orient="horz" pos="2164">
           <p15:clr>
             <a:srgbClr val="A4A3A4"/>
@@ -230,7 +230,7 @@
       </p15:sldGuideLst>
     </p:ext>
     <p:ext uri="{2D200454-40CA-4A62-9FC3-DE9A4176ACB9}">
-      <p15:notesGuideLst xmlns="" xmlns:p15="http://schemas.microsoft.com/office/powerpoint/2012/main"/>
+      <p15:notesGuideLst xmlns:p15="http://schemas.microsoft.com/office/powerpoint/2012/main"/>
     </p:ext>
   </p:extLst>
 </p:presentation>
@@ -319,7 +319,7 @@
             <a:fld id="{F4FB687C-3C2B-4BC0-A204-30428D9AA5D8}" type="datetimeFigureOut">
               <a:rPr lang="en-US" smtClean="0"/>
               <a:pPr/>
-              <a:t>12/2/16</a:t>
+              <a:t>10/29/17</a:t>
             </a:fld>
             <a:endParaRPr lang="en-US"/>
           </a:p>
@@ -2251,7 +2251,7 @@
             <a:fld id="{25AE17C7-B787-4E50-994D-5E804113A1E9}" type="datetime4">
               <a:rPr lang="en-US" smtClean="0"/>
               <a:pPr/>
-              <a:t>December 2, 2016</a:t>
+              <a:t>October 29, 2017</a:t>
             </a:fld>
             <a:endParaRPr lang="en-US" dirty="0"/>
           </a:p>
@@ -2426,7 +2426,7 @@
             <a:fld id="{8995D68B-21AC-438B-BECE-4F17DA129F19}" type="datetime4">
               <a:rPr lang="en-US" smtClean="0"/>
               <a:pPr/>
-              <a:t>December 2, 2016</a:t>
+              <a:t>October 29, 2017</a:t>
             </a:fld>
             <a:endParaRPr lang="en-US" dirty="0"/>
           </a:p>
@@ -2677,7 +2677,7 @@
             <a:fld id="{E637BB6B-EE1B-48FB-8575-0D55C373DE88}" type="datetimeFigureOut">
               <a:rPr lang="en-US" smtClean="0"/>
               <a:pPr eaLnBrk="1" latinLnBrk="0" hangingPunct="1"/>
-              <a:t>12/2/16</a:t>
+              <a:t>10/29/17</a:t>
             </a:fld>
             <a:endParaRPr lang="en-US" sz="1000">
               <a:solidFill>
@@ -3029,7 +3029,7 @@
             <a:fld id="{679F0FCF-2EA5-4FF5-AF14-1CA9C8854AAB}" type="datetime4">
               <a:rPr lang="en-US" smtClean="0"/>
               <a:pPr/>
-              <a:t>December 2, 2016</a:t>
+              <a:t>October 29, 2017</a:t>
             </a:fld>
             <a:endParaRPr lang="en-US" dirty="0"/>
           </a:p>
@@ -3323,7 +3323,7 @@
             <a:fld id="{F9E781C6-1634-4A56-B2BE-62150BE83935}" type="datetime4">
               <a:rPr lang="en-US" smtClean="0"/>
               <a:pPr/>
-              <a:t>December 2, 2016</a:t>
+              <a:t>October 29, 2017</a:t>
             </a:fld>
             <a:endParaRPr lang="en-US" dirty="0"/>
           </a:p>
@@ -3761,7 +3761,7 @@
             <a:fld id="{A9372AC2-3C75-4F5F-A929-48958086FE36}" type="datetime4">
               <a:rPr lang="en-US" smtClean="0"/>
               <a:pPr/>
-              <a:t>December 2, 2016</a:t>
+              <a:t>October 29, 2017</a:t>
             </a:fld>
             <a:endParaRPr lang="en-US" dirty="0"/>
           </a:p>
@@ -4094,7 +4094,7 @@
             <a:fld id="{17509CF4-4C1A-45DC-BADA-6EFF91CB9ABB}" type="datetime4">
               <a:rPr lang="en-US" smtClean="0"/>
               <a:pPr/>
-              <a:t>December 2, 2016</a:t>
+              <a:t>October 29, 2017</a:t>
             </a:fld>
             <a:endParaRPr lang="en-US" dirty="0"/>
           </a:p>
@@ -4186,7 +4186,7 @@
             <a:fld id="{C53951C0-B478-4858-ABC7-96406A1C0480}" type="datetime4">
               <a:rPr lang="en-US" smtClean="0"/>
               <a:pPr/>
-              <a:t>December 2, 2016</a:t>
+              <a:t>October 29, 2017</a:t>
             </a:fld>
             <a:endParaRPr lang="en-US" dirty="0"/>
           </a:p>
@@ -4469,7 +4469,7 @@
             <a:fld id="{B867641A-9D94-4BD6-862F-F651067079BC}" type="datetime4">
               <a:rPr lang="en-US" smtClean="0"/>
               <a:pPr/>
-              <a:t>December 2, 2016</a:t>
+              <a:t>October 29, 2017</a:t>
             </a:fld>
             <a:endParaRPr lang="en-US" dirty="0"/>
           </a:p>
@@ -4803,7 +4803,7 @@
             <a:fld id="{D74F0C02-0EF4-4745-9D82-E8D3F59464E3}" type="datetime4">
               <a:rPr lang="en-US" smtClean="0"/>
               <a:pPr/>
-              <a:t>December 2, 2016</a:t>
+              <a:t>October 29, 2017</a:t>
             </a:fld>
             <a:endParaRPr lang="en-US" dirty="0"/>
           </a:p>
@@ -5138,7 +5138,7 @@
             <a:fld id="{E637BB6B-EE1B-48FB-8575-0D55C373DE88}" type="datetimeFigureOut">
               <a:rPr lang="en-US" smtClean="0"/>
               <a:pPr eaLnBrk="1" latinLnBrk="0" hangingPunct="1"/>
-              <a:t>12/2/16</a:t>
+              <a:t>10/29/17</a:t>
             </a:fld>
             <a:endParaRPr lang="en-US" sz="1000">
               <a:solidFill>
@@ -5493,7 +5493,7 @@
             <a:fld id="{E637BB6B-EE1B-48FB-8575-0D55C373DE88}" type="datetimeFigureOut">
               <a:rPr lang="en-US" smtClean="0"/>
               <a:pPr eaLnBrk="1" latinLnBrk="0" hangingPunct="1"/>
-              <a:t>12/2/16</a:t>
+              <a:t>10/29/17</a:t>
             </a:fld>
             <a:endParaRPr lang="en-US" sz="1000">
               <a:solidFill>
@@ -6204,7 +6204,7 @@
             <a:fld id="{AFDD7A28-FA93-4136-BDC1-BCCB2687E678}" type="datetimeFigureOut">
               <a:rPr lang="en-US" smtClean="0"/>
               <a:pPr/>
-              <a:t>12/2/16</a:t>
+              <a:t>10/29/17</a:t>
             </a:fld>
             <a:endParaRPr lang="en-US"/>
           </a:p>
@@ -6384,7 +6384,7 @@
           <a:p>
             <a:fld id="{6BFECD78-3C8E-49F2-8FAB-59489D168ABB}" type="datetimeFigureOut">
               <a:rPr lang="en-US" smtClean="0"/>
-              <a:t>12/2/16</a:t>
+              <a:t>10/29/17</a:t>
             </a:fld>
             <a:endParaRPr lang="en-US"/>
           </a:p>
@@ -7845,14 +7845,14 @@
           </a:ln>
           <a:extLst>
             <a:ext uri="{909E8E84-426E-40dd-AFC4-6F175D3DCCD1}">
-              <a14:hiddenFill xmlns:a14="http://schemas.microsoft.com/office/drawing/2010/main">
+              <a14:hiddenFill xmlns="" xmlns:a14="http://schemas.microsoft.com/office/drawing/2010/main">
                 <a:solidFill>
                   <a:srgbClr val="FFFFFF"/>
                 </a:solidFill>
               </a14:hiddenFill>
             </a:ext>
             <a:ext uri="{91240B29-F687-4f45-9708-019B960494DF}">
-              <a14:hiddenLine xmlns:a14="http://schemas.microsoft.com/office/drawing/2010/main" w="9525">
+              <a14:hiddenLine xmlns="" xmlns:a14="http://schemas.microsoft.com/office/drawing/2010/main" w="9525">
                 <a:solidFill>
                   <a:srgbClr val="000000"/>
                 </a:solidFill>
@@ -8480,14 +8480,14 @@
           </a:ln>
           <a:extLst>
             <a:ext uri="{909E8E84-426E-40dd-AFC4-6F175D3DCCD1}">
-              <a14:hiddenFill xmlns:a14="http://schemas.microsoft.com/office/drawing/2010/main">
+              <a14:hiddenFill xmlns="" xmlns:a14="http://schemas.microsoft.com/office/drawing/2010/main">
                 <a:solidFill>
                   <a:srgbClr val="FFFFFF"/>
                 </a:solidFill>
               </a14:hiddenFill>
             </a:ext>
             <a:ext uri="{91240B29-F687-4f45-9708-019B960494DF}">
-              <a14:hiddenLine xmlns:a14="http://schemas.microsoft.com/office/drawing/2010/main" w="9525">
+              <a14:hiddenLine xmlns="" xmlns:a14="http://schemas.microsoft.com/office/drawing/2010/main" w="9525">
                 <a:solidFill>
                   <a:srgbClr val="000000"/>
                 </a:solidFill>
@@ -9008,7 +9008,7 @@
           <a:p>
             <a:fld id="{651A0C47-018D-4460-B945-BFF7981B6CA6}" type="datetimeFigureOut">
               <a:rPr lang="en-US" smtClean="0"/>
-              <a:t>12/2/16</a:t>
+              <a:t>10/29/17</a:t>
             </a:fld>
             <a:endParaRPr lang="en-US"/>
           </a:p>
@@ -9539,7 +9539,7 @@
   <p:timing>
     <p:tnLst>
       <p:par>
-        <p:cTn xmlns:p14="http://schemas.microsoft.com/office/powerpoint/2010/main" id="1" dur="indefinite" restart="never" nodeType="tmRoot"/>
+        <p:cTn id="1" dur="indefinite" restart="never" nodeType="tmRoot"/>
       </p:par>
     </p:tnLst>
   </p:timing>
@@ -9729,7 +9729,7 @@
   <p:timing>
     <p:tnLst>
       <p:par>
-        <p:cTn xmlns:p14="http://schemas.microsoft.com/office/powerpoint/2010/main" id="1" dur="indefinite" restart="never" nodeType="tmRoot">
+        <p:cTn id="1" dur="indefinite" restart="never" nodeType="tmRoot">
           <p:childTnLst>
             <p:seq concurrent="1" nextAc="seek">
               <p:cTn id="2" dur="indefinite" nodeType="mainSeq">
@@ -10266,36 +10266,6 @@
       </p:pic>
       <p:pic>
         <p:nvPicPr>
-          <p:cNvPr id="9" name="Picture 8" descr="django-logo-e1392910534114.png"/>
-          <p:cNvPicPr>
-            <a:picLocks noChangeAspect="1"/>
-          </p:cNvPicPr>
-          <p:nvPr/>
-        </p:nvPicPr>
-        <p:blipFill>
-          <a:blip r:embed="rId4">
-            <a:extLst>
-              <a:ext uri="{28A0092B-C50C-407E-A947-70E740481C1C}">
-                <a14:useLocalDpi xmlns:a14="http://schemas.microsoft.com/office/drawing/2010/main" val="0"/>
-              </a:ext>
-            </a:extLst>
-          </a:blip>
-          <a:stretch>
-            <a:fillRect/>
-          </a:stretch>
-        </p:blipFill>
-        <p:spPr>
-          <a:xfrm>
-            <a:off x="3769179" y="2925910"/>
-            <a:ext cx="1644743" cy="739775"/>
-          </a:xfrm>
-          <a:prstGeom prst="rect">
-            <a:avLst/>
-          </a:prstGeom>
-        </p:spPr>
-      </p:pic>
-      <p:pic>
-        <p:nvPicPr>
           <p:cNvPr id="10" name="Picture 9" descr="python.png"/>
           <p:cNvPicPr>
             <a:picLocks noChangeAspect="1"/>
@@ -10303,7 +10273,7 @@
           <p:nvPr/>
         </p:nvPicPr>
         <p:blipFill>
-          <a:blip r:embed="rId5" cstate="print">
+          <a:blip r:embed="rId4" cstate="print">
             <a:extLst>
               <a:ext uri="{28A0092B-C50C-407E-A947-70E740481C1C}">
                 <a14:useLocalDpi xmlns:a14="http://schemas.microsoft.com/office/drawing/2010/main" val="0"/>
@@ -10333,7 +10303,7 @@
           <p:nvPr/>
         </p:nvPicPr>
         <p:blipFill>
-          <a:blip r:embed="rId6">
+          <a:blip r:embed="rId5">
             <a:extLst>
               <a:ext uri="{28A0092B-C50C-407E-A947-70E740481C1C}">
                 <a14:useLocalDpi xmlns:a14="http://schemas.microsoft.com/office/drawing/2010/main" val="0"/>
@@ -10584,9 +10554,7 @@
       <p:cxnSp>
         <p:nvCxnSpPr>
           <p:cNvPr id="73" name="Elbow Connector 72"/>
-          <p:cNvCxnSpPr>
-            <a:endCxn id="9" idx="3"/>
-          </p:cNvCxnSpPr>
+          <p:cNvCxnSpPr/>
           <p:nvPr/>
         </p:nvCxnSpPr>
         <p:spPr>
@@ -10725,7 +10693,7 @@
           <p:nvPr/>
         </p:nvPicPr>
         <p:blipFill rotWithShape="1">
-          <a:blip r:embed="rId7" cstate="print"/>
+          <a:blip r:embed="rId6" cstate="print"/>
           <a:srcRect l="13723" t="33474" r="922" b="14961"/>
           <a:stretch/>
         </p:blipFill>
@@ -10850,8 +10818,8 @@
         </p:nvSpPr>
         <p:spPr>
           <a:xfrm>
-            <a:off x="3271838" y="3676650"/>
-            <a:ext cx="396875" cy="1143000"/>
+            <a:off x="3271838" y="3492501"/>
+            <a:ext cx="396875" cy="1327149"/>
           </a:xfrm>
           <a:prstGeom prst="curvedRightArrow">
             <a:avLst/>
@@ -11066,6 +11034,56 @@
           </a:p>
         </p:txBody>
       </p:sp>
+      <p:sp>
+        <p:nvSpPr>
+          <p:cNvPr id="3" name="Rounded Rectangle 2"/>
+          <p:cNvSpPr/>
+          <p:nvPr/>
+        </p:nvSpPr>
+        <p:spPr>
+          <a:xfrm>
+            <a:off x="3887800" y="2957978"/>
+            <a:ext cx="1414543" cy="779951"/>
+          </a:xfrm>
+          <a:prstGeom prst="roundRect">
+            <a:avLst/>
+          </a:prstGeom>
+        </p:spPr>
+        <p:style>
+          <a:lnRef idx="1">
+            <a:schemeClr val="accent1"/>
+          </a:lnRef>
+          <a:fillRef idx="3">
+            <a:schemeClr val="accent1"/>
+          </a:fillRef>
+          <a:effectRef idx="2">
+            <a:schemeClr val="accent1"/>
+          </a:effectRef>
+          <a:fontRef idx="minor">
+            <a:schemeClr val="lt1"/>
+          </a:fontRef>
+        </p:style>
+        <p:txBody>
+          <a:bodyPr rtlCol="0" anchor="ctr"/>
+          <a:lstStyle/>
+          <a:p>
+            <a:pPr algn="ctr"/>
+            <a:r>
+              <a:rPr lang="en-US" altLang="zh-CN" sz="2800" dirty="0" smtClean="0">
+                <a:latin typeface="Arial" charset="0"/>
+                <a:ea typeface="Arial" charset="0"/>
+                <a:cs typeface="Arial" charset="0"/>
+              </a:rPr>
+              <a:t>Flask</a:t>
+            </a:r>
+            <a:endParaRPr lang="en-US" sz="2800" dirty="0">
+              <a:latin typeface="Arial" charset="0"/>
+              <a:ea typeface="Arial" charset="0"/>
+              <a:cs typeface="Arial" charset="0"/>
+            </a:endParaRPr>
+          </a:p>
+        </p:txBody>
+      </p:sp>
     </p:spTree>
     <p:extLst>
       <p:ext uri="{BB962C8B-B14F-4D97-AF65-F5344CB8AC3E}">
@@ -11087,7 +11105,7 @@
   <p:timing>
     <p:tnLst>
       <p:par>
-        <p:cTn xmlns:p14="http://schemas.microsoft.com/office/powerpoint/2010/main" id="1" dur="indefinite" restart="never" nodeType="tmRoot">
+        <p:cTn id="1" dur="indefinite" restart="never" nodeType="tmRoot">
           <p:childTnLst>
             <p:seq concurrent="1" nextAc="seek">
               <p:cTn id="2" dur="indefinite" nodeType="mainSeq">
@@ -11154,7 +11172,7 @@
                                           </p:stCondLst>
                                         </p:cTn>
                                         <p:tgtEl>
-                                          <p:spTgt spid="9"/>
+                                          <p:spTgt spid="10"/>
                                         </p:tgtEl>
                                         <p:attrNameLst>
                                           <p:attrName>style.visibility</p:attrName>
@@ -11190,42 +11208,6 @@
                                           </p:stCondLst>
                                         </p:cTn>
                                         <p:tgtEl>
-                                          <p:spTgt spid="10"/>
-                                        </p:tgtEl>
-                                        <p:attrNameLst>
-                                          <p:attrName>style.visibility</p:attrName>
-                                        </p:attrNameLst>
-                                      </p:cBhvr>
-                                      <p:to>
-                                        <p:strVal val="visible"/>
-                                      </p:to>
-                                    </p:set>
-                                  </p:childTnLst>
-                                </p:cTn>
-                              </p:par>
-                            </p:childTnLst>
-                          </p:cTn>
-                        </p:par>
-                        <p:par>
-                          <p:cTn id="13" fill="hold">
-                            <p:stCondLst>
-                              <p:cond delay="1000"/>
-                            </p:stCondLst>
-                            <p:childTnLst>
-                              <p:par>
-                                <p:cTn id="14" presetID="1" presetClass="entr" presetSubtype="0" fill="hold" nodeType="afterEffect">
-                                  <p:stCondLst>
-                                    <p:cond delay="500"/>
-                                  </p:stCondLst>
-                                  <p:childTnLst>
-                                    <p:set>
-                                      <p:cBhvr>
-                                        <p:cTn id="15" dur="1" fill="hold">
-                                          <p:stCondLst>
-                                            <p:cond delay="0"/>
-                                          </p:stCondLst>
-                                        </p:cTn>
-                                        <p:tgtEl>
                                           <p:spTgt spid="11"/>
                                         </p:tgtEl>
                                         <p:attrNameLst>
@@ -11246,26 +11228,26 @@
                     </p:cTn>
                   </p:par>
                   <p:par>
-                    <p:cTn id="16" fill="hold">
+                    <p:cTn id="13" fill="hold">
                       <p:stCondLst>
                         <p:cond delay="indefinite"/>
                       </p:stCondLst>
                       <p:childTnLst>
                         <p:par>
-                          <p:cTn id="17" fill="hold">
+                          <p:cTn id="14" fill="hold">
                             <p:stCondLst>
                               <p:cond delay="0"/>
                             </p:stCondLst>
                             <p:childTnLst>
                               <p:par>
-                                <p:cTn id="18" presetID="1" presetClass="entr" presetSubtype="0" fill="hold" nodeType="clickEffect">
+                                <p:cTn id="15" presetID="1" presetClass="entr" presetSubtype="0" fill="hold" nodeType="clickEffect">
                                   <p:stCondLst>
                                     <p:cond delay="0"/>
                                   </p:stCondLst>
                                   <p:childTnLst>
                                     <p:set>
                                       <p:cBhvr>
-                                        <p:cTn id="19" dur="1" fill="hold">
+                                        <p:cTn id="16" dur="1" fill="hold">
                                           <p:stCondLst>
                                             <p:cond delay="0"/>
                                           </p:stCondLst>
@@ -11288,20 +11270,20 @@
                           </p:cTn>
                         </p:par>
                         <p:par>
-                          <p:cTn id="20" fill="hold">
+                          <p:cTn id="17" fill="hold">
                             <p:stCondLst>
                               <p:cond delay="0"/>
                             </p:stCondLst>
                             <p:childTnLst>
                               <p:par>
-                                <p:cTn id="21" presetID="1" presetClass="entr" presetSubtype="0" fill="hold" grpId="0" nodeType="afterEffect">
+                                <p:cTn id="18" presetID="1" presetClass="entr" presetSubtype="0" fill="hold" grpId="0" nodeType="afterEffect">
                                   <p:stCondLst>
                                     <p:cond delay="500"/>
                                   </p:stCondLst>
                                   <p:childTnLst>
                                     <p:set>
                                       <p:cBhvr>
-                                        <p:cTn id="22" dur="1" fill="hold">
+                                        <p:cTn id="19" dur="1" fill="hold">
                                           <p:stCondLst>
                                             <p:cond delay="0"/>
                                           </p:stCondLst>
@@ -11324,20 +11306,20 @@
                           </p:cTn>
                         </p:par>
                         <p:par>
-                          <p:cTn id="23" fill="hold">
+                          <p:cTn id="20" fill="hold">
                             <p:stCondLst>
                               <p:cond delay="500"/>
                             </p:stCondLst>
                             <p:childTnLst>
                               <p:par>
-                                <p:cTn id="24" presetID="1" presetClass="entr" presetSubtype="0" fill="hold" grpId="0" nodeType="afterEffect">
+                                <p:cTn id="21" presetID="1" presetClass="entr" presetSubtype="0" fill="hold" grpId="0" nodeType="afterEffect">
                                   <p:stCondLst>
                                     <p:cond delay="500"/>
                                   </p:stCondLst>
                                   <p:childTnLst>
                                     <p:set>
                                       <p:cBhvr>
-                                        <p:cTn id="25" dur="1" fill="hold">
+                                        <p:cTn id="22" dur="1" fill="hold">
                                           <p:stCondLst>
                                             <p:cond delay="0"/>
                                           </p:stCondLst>
@@ -11363,26 +11345,26 @@
                     </p:cTn>
                   </p:par>
                   <p:par>
-                    <p:cTn id="26" fill="hold">
+                    <p:cTn id="23" fill="hold">
                       <p:stCondLst>
                         <p:cond delay="indefinite"/>
                       </p:stCondLst>
                       <p:childTnLst>
                         <p:par>
-                          <p:cTn id="27" fill="hold">
+                          <p:cTn id="24" fill="hold">
                             <p:stCondLst>
                               <p:cond delay="0"/>
                             </p:stCondLst>
                             <p:childTnLst>
                               <p:par>
-                                <p:cTn id="28" presetID="1" presetClass="entr" presetSubtype="0" fill="hold" grpId="0" nodeType="clickEffect">
+                                <p:cTn id="25" presetID="1" presetClass="entr" presetSubtype="0" fill="hold" grpId="0" nodeType="clickEffect">
                                   <p:stCondLst>
                                     <p:cond delay="0"/>
                                   </p:stCondLst>
                                   <p:childTnLst>
                                     <p:set>
                                       <p:cBhvr>
-                                        <p:cTn id="29" dur="1" fill="hold">
+                                        <p:cTn id="26" dur="1" fill="hold">
                                           <p:stCondLst>
                                             <p:cond delay="0"/>
                                           </p:stCondLst>
@@ -11405,20 +11387,20 @@
                           </p:cTn>
                         </p:par>
                         <p:par>
-                          <p:cTn id="30" fill="hold">
+                          <p:cTn id="27" fill="hold">
                             <p:stCondLst>
                               <p:cond delay="0"/>
                             </p:stCondLst>
                             <p:childTnLst>
                               <p:par>
-                                <p:cTn id="31" presetID="1" presetClass="entr" presetSubtype="0" fill="hold" grpId="0" nodeType="afterEffect">
+                                <p:cTn id="28" presetID="1" presetClass="entr" presetSubtype="0" fill="hold" grpId="0" nodeType="afterEffect">
                                   <p:stCondLst>
                                     <p:cond delay="500"/>
                                   </p:stCondLst>
                                   <p:childTnLst>
                                     <p:set>
                                       <p:cBhvr>
-                                        <p:cTn id="32" dur="1" fill="hold">
+                                        <p:cTn id="29" dur="1" fill="hold">
                                           <p:stCondLst>
                                             <p:cond delay="0"/>
                                           </p:stCondLst>
@@ -11444,26 +11426,26 @@
                     </p:cTn>
                   </p:par>
                   <p:par>
-                    <p:cTn id="33" fill="hold">
+                    <p:cTn id="30" fill="hold">
                       <p:stCondLst>
                         <p:cond delay="indefinite"/>
                       </p:stCondLst>
                       <p:childTnLst>
                         <p:par>
-                          <p:cTn id="34" fill="hold">
+                          <p:cTn id="31" fill="hold">
                             <p:stCondLst>
                               <p:cond delay="0"/>
                             </p:stCondLst>
                             <p:childTnLst>
                               <p:par>
-                                <p:cTn id="35" presetID="1" presetClass="entr" presetSubtype="0" fill="hold" grpId="0" nodeType="clickEffect">
+                                <p:cTn id="32" presetID="1" presetClass="entr" presetSubtype="0" fill="hold" grpId="0" nodeType="clickEffect">
                                   <p:stCondLst>
                                     <p:cond delay="0"/>
                                   </p:stCondLst>
                                   <p:childTnLst>
                                     <p:set>
                                       <p:cBhvr>
-                                        <p:cTn id="36" dur="1" fill="hold">
+                                        <p:cTn id="33" dur="1" fill="hold">
                                           <p:stCondLst>
                                             <p:cond delay="0"/>
                                           </p:stCondLst>
@@ -11489,26 +11471,26 @@
                     </p:cTn>
                   </p:par>
                   <p:par>
-                    <p:cTn id="37" fill="hold">
+                    <p:cTn id="34" fill="hold">
                       <p:stCondLst>
                         <p:cond delay="indefinite"/>
                       </p:stCondLst>
                       <p:childTnLst>
                         <p:par>
-                          <p:cTn id="38" fill="hold">
+                          <p:cTn id="35" fill="hold">
                             <p:stCondLst>
                               <p:cond delay="0"/>
                             </p:stCondLst>
                             <p:childTnLst>
                               <p:par>
-                                <p:cTn id="39" presetID="1" presetClass="entr" presetSubtype="0" fill="hold" grpId="0" nodeType="clickEffect">
+                                <p:cTn id="36" presetID="1" presetClass="entr" presetSubtype="0" fill="hold" grpId="0" nodeType="clickEffect">
                                   <p:stCondLst>
                                     <p:cond delay="0"/>
                                   </p:stCondLst>
                                   <p:childTnLst>
                                     <p:set>
                                       <p:cBhvr>
-                                        <p:cTn id="40" dur="1" fill="hold">
+                                        <p:cTn id="37" dur="1" fill="hold">
                                           <p:stCondLst>
                                             <p:cond delay="0"/>
                                           </p:stCondLst>
@@ -11531,20 +11513,20 @@
                           </p:cTn>
                         </p:par>
                         <p:par>
-                          <p:cTn id="41" fill="hold">
+                          <p:cTn id="38" fill="hold">
                             <p:stCondLst>
                               <p:cond delay="0"/>
                             </p:stCondLst>
                             <p:childTnLst>
                               <p:par>
-                                <p:cTn id="42" presetID="1" presetClass="entr" presetSubtype="0" fill="hold" grpId="0" nodeType="afterEffect">
+                                <p:cTn id="39" presetID="1" presetClass="entr" presetSubtype="0" fill="hold" grpId="0" nodeType="afterEffect">
                                   <p:stCondLst>
                                     <p:cond delay="500"/>
                                   </p:stCondLst>
                                   <p:childTnLst>
                                     <p:set>
                                       <p:cBhvr>
-                                        <p:cTn id="43" dur="1" fill="hold">
+                                        <p:cTn id="40" dur="1" fill="hold">
                                           <p:stCondLst>
                                             <p:cond delay="0"/>
                                           </p:stCondLst>
@@ -11570,26 +11552,26 @@
                     </p:cTn>
                   </p:par>
                   <p:par>
-                    <p:cTn id="44" fill="hold">
+                    <p:cTn id="41" fill="hold">
                       <p:stCondLst>
                         <p:cond delay="indefinite"/>
                       </p:stCondLst>
                       <p:childTnLst>
                         <p:par>
-                          <p:cTn id="45" fill="hold">
+                          <p:cTn id="42" fill="hold">
                             <p:stCondLst>
                               <p:cond delay="0"/>
                             </p:stCondLst>
                             <p:childTnLst>
                               <p:par>
-                                <p:cTn id="46" presetID="1" presetClass="entr" presetSubtype="0" fill="hold" nodeType="clickEffect">
+                                <p:cTn id="43" presetID="1" presetClass="entr" presetSubtype="0" fill="hold" nodeType="clickEffect">
                                   <p:stCondLst>
                                     <p:cond delay="0"/>
                                   </p:stCondLst>
                                   <p:childTnLst>
                                     <p:set>
                                       <p:cBhvr>
-                                        <p:cTn id="47" dur="1" fill="hold">
+                                        <p:cTn id="44" dur="1" fill="hold">
                                           <p:stCondLst>
                                             <p:cond delay="0"/>
                                           </p:stCondLst>
@@ -11609,14 +11591,14 @@
                                 </p:cTn>
                               </p:par>
                               <p:par>
-                                <p:cTn id="48" presetID="1" presetClass="entr" presetSubtype="0" fill="hold" grpId="0" nodeType="withEffect">
+                                <p:cTn id="45" presetID="1" presetClass="entr" presetSubtype="0" fill="hold" grpId="0" nodeType="withEffect">
                                   <p:stCondLst>
                                     <p:cond delay="0"/>
                                   </p:stCondLst>
                                   <p:childTnLst>
                                     <p:set>
                                       <p:cBhvr>
-                                        <p:cTn id="49" dur="1" fill="hold">
+                                        <p:cTn id="46" dur="1" fill="hold">
                                           <p:stCondLst>
                                             <p:cond delay="0"/>
                                           </p:stCondLst>
@@ -11642,26 +11624,26 @@
                     </p:cTn>
                   </p:par>
                   <p:par>
-                    <p:cTn id="50" fill="hold">
+                    <p:cTn id="47" fill="hold">
                       <p:stCondLst>
                         <p:cond delay="indefinite"/>
                       </p:stCondLst>
                       <p:childTnLst>
                         <p:par>
-                          <p:cTn id="51" fill="hold">
+                          <p:cTn id="48" fill="hold">
                             <p:stCondLst>
                               <p:cond delay="0"/>
                             </p:stCondLst>
                             <p:childTnLst>
                               <p:par>
-                                <p:cTn id="52" presetID="1" presetClass="entr" presetSubtype="0" fill="hold" nodeType="clickEffect">
+                                <p:cTn id="49" presetID="1" presetClass="entr" presetSubtype="0" fill="hold" nodeType="clickEffect">
                                   <p:stCondLst>
                                     <p:cond delay="0"/>
                                   </p:stCondLst>
                                   <p:childTnLst>
                                     <p:set>
                                       <p:cBhvr>
-                                        <p:cTn id="53" dur="1" fill="hold">
+                                        <p:cTn id="50" dur="1" fill="hold">
                                           <p:stCondLst>
                                             <p:cond delay="0"/>
                                           </p:stCondLst>
@@ -11681,14 +11663,14 @@
                                 </p:cTn>
                               </p:par>
                               <p:par>
-                                <p:cTn id="54" presetID="1" presetClass="entr" presetSubtype="0" fill="hold" grpId="0" nodeType="withEffect">
+                                <p:cTn id="51" presetID="1" presetClass="entr" presetSubtype="0" fill="hold" grpId="0" nodeType="withEffect">
                                   <p:stCondLst>
                                     <p:cond delay="0"/>
                                   </p:stCondLst>
                                   <p:childTnLst>
                                     <p:set>
                                       <p:cBhvr>
-                                        <p:cTn id="55" dur="1" fill="hold">
+                                        <p:cTn id="52" dur="1" fill="hold">
                                           <p:stCondLst>
                                             <p:cond delay="0"/>
                                           </p:stCondLst>
@@ -11714,26 +11696,26 @@
                     </p:cTn>
                   </p:par>
                   <p:par>
-                    <p:cTn id="56" fill="hold">
+                    <p:cTn id="53" fill="hold">
                       <p:stCondLst>
                         <p:cond delay="indefinite"/>
                       </p:stCondLst>
                       <p:childTnLst>
                         <p:par>
-                          <p:cTn id="57" fill="hold">
+                          <p:cTn id="54" fill="hold">
                             <p:stCondLst>
                               <p:cond delay="0"/>
                             </p:stCondLst>
                             <p:childTnLst>
                               <p:par>
-                                <p:cTn id="58" presetID="1" presetClass="entr" presetSubtype="0" fill="hold" nodeType="clickEffect">
+                                <p:cTn id="55" presetID="1" presetClass="entr" presetSubtype="0" fill="hold" nodeType="clickEffect">
                                   <p:stCondLst>
                                     <p:cond delay="0"/>
                                   </p:stCondLst>
                                   <p:childTnLst>
                                     <p:set>
                                       <p:cBhvr>
-                                        <p:cTn id="59" dur="1" fill="hold">
+                                        <p:cTn id="56" dur="1" fill="hold">
                                           <p:stCondLst>
                                             <p:cond delay="0"/>
                                           </p:stCondLst>
@@ -11753,14 +11735,14 @@
                                 </p:cTn>
                               </p:par>
                               <p:par>
-                                <p:cTn id="60" presetID="1" presetClass="entr" presetSubtype="0" fill="hold" grpId="0" nodeType="withEffect">
+                                <p:cTn id="57" presetID="1" presetClass="entr" presetSubtype="0" fill="hold" grpId="0" nodeType="withEffect">
                                   <p:stCondLst>
                                     <p:cond delay="0"/>
                                   </p:stCondLst>
                                   <p:childTnLst>
                                     <p:set>
                                       <p:cBhvr>
-                                        <p:cTn id="61" dur="1" fill="hold">
+                                        <p:cTn id="58" dur="1" fill="hold">
                                           <p:stCondLst>
                                             <p:cond delay="0"/>
                                           </p:stCondLst>
@@ -11786,26 +11768,26 @@
                     </p:cTn>
                   </p:par>
                   <p:par>
-                    <p:cTn id="62" fill="hold">
+                    <p:cTn id="59" fill="hold">
                       <p:stCondLst>
                         <p:cond delay="indefinite"/>
                       </p:stCondLst>
                       <p:childTnLst>
                         <p:par>
-                          <p:cTn id="63" fill="hold">
+                          <p:cTn id="60" fill="hold">
                             <p:stCondLst>
                               <p:cond delay="0"/>
                             </p:stCondLst>
                             <p:childTnLst>
                               <p:par>
-                                <p:cTn id="64" presetID="1" presetClass="entr" presetSubtype="0" fill="hold" nodeType="clickEffect">
+                                <p:cTn id="61" presetID="1" presetClass="entr" presetSubtype="0" fill="hold" nodeType="clickEffect">
                                   <p:stCondLst>
                                     <p:cond delay="0"/>
                                   </p:stCondLst>
                                   <p:childTnLst>
                                     <p:set>
                                       <p:cBhvr>
-                                        <p:cTn id="65" dur="1" fill="hold">
+                                        <p:cTn id="62" dur="1" fill="hold">
                                           <p:stCondLst>
                                             <p:cond delay="0"/>
                                           </p:stCondLst>
@@ -11831,26 +11813,26 @@
                     </p:cTn>
                   </p:par>
                   <p:par>
-                    <p:cTn id="66" fill="hold">
+                    <p:cTn id="63" fill="hold">
                       <p:stCondLst>
                         <p:cond delay="indefinite"/>
                       </p:stCondLst>
                       <p:childTnLst>
                         <p:par>
-                          <p:cTn id="67" fill="hold">
+                          <p:cTn id="64" fill="hold">
                             <p:stCondLst>
                               <p:cond delay="0"/>
                             </p:stCondLst>
                             <p:childTnLst>
                               <p:par>
-                                <p:cTn id="68" presetID="1" presetClass="entr" presetSubtype="0" fill="hold" nodeType="clickEffect">
+                                <p:cTn id="65" presetID="1" presetClass="entr" presetSubtype="0" fill="hold" nodeType="clickEffect">
                                   <p:stCondLst>
                                     <p:cond delay="0"/>
                                   </p:stCondLst>
                                   <p:childTnLst>
                                     <p:set>
                                       <p:cBhvr>
-                                        <p:cTn id="69" dur="1" fill="hold">
+                                        <p:cTn id="66" dur="1" fill="hold">
                                           <p:stCondLst>
                                             <p:cond delay="0"/>
                                           </p:stCondLst>
@@ -12106,7 +12088,7 @@
   <p:timing>
     <p:tnLst>
       <p:par>
-        <p:cTn xmlns:p14="http://schemas.microsoft.com/office/powerpoint/2010/main" id="1" dur="indefinite" restart="never" nodeType="tmRoot"/>
+        <p:cTn id="1" dur="indefinite" restart="never" nodeType="tmRoot"/>
       </p:par>
     </p:tnLst>
   </p:timing>
@@ -12222,7 +12204,7 @@
   <p:timing>
     <p:tnLst>
       <p:par>
-        <p:cTn xmlns:p14="http://schemas.microsoft.com/office/powerpoint/2010/main" id="1" dur="indefinite" restart="never" nodeType="tmRoot"/>
+        <p:cTn id="1" dur="indefinite" restart="never" nodeType="tmRoot"/>
       </p:par>
     </p:tnLst>
   </p:timing>
@@ -12334,7 +12316,7 @@
   <p:timing>
     <p:tnLst>
       <p:par>
-        <p:cTn xmlns:p14="http://schemas.microsoft.com/office/powerpoint/2010/main" id="1" dur="indefinite" restart="never" nodeType="tmRoot"/>
+        <p:cTn id="1" dur="indefinite" restart="never" nodeType="tmRoot"/>
       </p:par>
     </p:tnLst>
   </p:timing>
@@ -12444,7 +12426,7 @@
   <p:timing>
     <p:tnLst>
       <p:par>
-        <p:cTn xmlns:p14="http://schemas.microsoft.com/office/powerpoint/2010/main" id="1" dur="indefinite" restart="never" nodeType="tmRoot"/>
+        <p:cTn id="1" dur="indefinite" restart="never" nodeType="tmRoot"/>
       </p:par>
     </p:tnLst>
   </p:timing>
@@ -12550,7 +12532,7 @@
   <p:timing>
     <p:tnLst>
       <p:par>
-        <p:cTn xmlns:p14="http://schemas.microsoft.com/office/powerpoint/2010/main" id="1" dur="indefinite" restart="never" nodeType="tmRoot"/>
+        <p:cTn id="1" dur="indefinite" restart="never" nodeType="tmRoot"/>
       </p:par>
     </p:tnLst>
   </p:timing>
@@ -12658,7 +12640,7 @@
   <p:timing>
     <p:tnLst>
       <p:par>
-        <p:cTn xmlns:p14="http://schemas.microsoft.com/office/powerpoint/2010/main" id="1" dur="indefinite" restart="never" nodeType="tmRoot"/>
+        <p:cTn id="1" dur="indefinite" restart="never" nodeType="tmRoot"/>
       </p:par>
     </p:tnLst>
   </p:timing>
@@ -12766,7 +12748,7 @@
   <p:timing>
     <p:tnLst>
       <p:par>
-        <p:cTn xmlns:p14="http://schemas.microsoft.com/office/powerpoint/2010/main" id="1" dur="indefinite" restart="never" nodeType="tmRoot"/>
+        <p:cTn id="1" dur="indefinite" restart="never" nodeType="tmRoot"/>
       </p:par>
     </p:tnLst>
   </p:timing>
@@ -12874,7 +12856,7 @@
   <p:timing>
     <p:tnLst>
       <p:par>
-        <p:cTn xmlns:p14="http://schemas.microsoft.com/office/powerpoint/2010/main" id="1" dur="indefinite" restart="never" nodeType="tmRoot"/>
+        <p:cTn id="1" dur="indefinite" restart="never" nodeType="tmRoot"/>
       </p:par>
     </p:tnLst>
   </p:timing>
@@ -13259,7 +13241,7 @@
   <p:timing>
     <p:tnLst>
       <p:par>
-        <p:cTn xmlns:p14="http://schemas.microsoft.com/office/powerpoint/2010/main" id="1" dur="indefinite" restart="never" nodeType="tmRoot">
+        <p:cTn id="1" dur="indefinite" restart="never" nodeType="tmRoot">
           <p:childTnLst>
             <p:seq concurrent="1" nextAc="seek">
               <p:cTn id="2" dur="indefinite" nodeType="mainSeq">
@@ -13650,7 +13632,7 @@
   <p:timing>
     <p:tnLst>
       <p:par>
-        <p:cTn xmlns:p14="http://schemas.microsoft.com/office/powerpoint/2010/main" id="1" dur="indefinite" restart="never" nodeType="tmRoot"/>
+        <p:cTn id="1" dur="indefinite" restart="never" nodeType="tmRoot"/>
       </p:par>
     </p:tnLst>
   </p:timing>
@@ -13880,7 +13862,7 @@
   <p:timing>
     <p:tnLst>
       <p:par>
-        <p:cTn xmlns:p14="http://schemas.microsoft.com/office/powerpoint/2010/main" id="1" dur="indefinite" restart="never" nodeType="tmRoot"/>
+        <p:cTn id="1" dur="indefinite" restart="never" nodeType="tmRoot"/>
       </p:par>
     </p:tnLst>
   </p:timing>
@@ -14545,7 +14527,7 @@
   <p:timing>
     <p:tnLst>
       <p:par>
-        <p:cTn xmlns:p14="http://schemas.microsoft.com/office/powerpoint/2010/main" id="1" dur="indefinite" restart="never" nodeType="tmRoot"/>
+        <p:cTn id="1" dur="indefinite" restart="never" nodeType="tmRoot"/>
       </p:par>
     </p:tnLst>
   </p:timing>
@@ -14750,7 +14732,7 @@
   <p:timing>
     <p:tnLst>
       <p:par>
-        <p:cTn xmlns:p14="http://schemas.microsoft.com/office/powerpoint/2010/main" id="1" dur="indefinite" restart="never" nodeType="tmRoot"/>
+        <p:cTn id="1" dur="indefinite" restart="never" nodeType="tmRoot"/>
       </p:par>
     </p:tnLst>
   </p:timing>
@@ -15460,7 +15442,7 @@
   <p:timing>
     <p:tnLst>
       <p:par>
-        <p:cTn xmlns:p14="http://schemas.microsoft.com/office/powerpoint/2010/main" id="1" dur="indefinite" restart="never" nodeType="tmRoot"/>
+        <p:cTn id="1" dur="indefinite" restart="never" nodeType="tmRoot"/>
       </p:par>
     </p:tnLst>
   </p:timing>
@@ -15641,7 +15623,7 @@
   <p:timing>
     <p:tnLst>
       <p:par>
-        <p:cTn xmlns:p14="http://schemas.microsoft.com/office/powerpoint/2010/main" id="1" dur="indefinite" restart="never" nodeType="tmRoot"/>
+        <p:cTn id="1" dur="indefinite" restart="never" nodeType="tmRoot"/>
       </p:par>
     </p:tnLst>
   </p:timing>
@@ -15807,7 +15789,7 @@
   <p:timing>
     <p:tnLst>
       <p:par>
-        <p:cTn xmlns:p14="http://schemas.microsoft.com/office/powerpoint/2010/main" id="1" dur="indefinite" restart="never" nodeType="tmRoot"/>
+        <p:cTn id="1" dur="indefinite" restart="never" nodeType="tmRoot"/>
       </p:par>
     </p:tnLst>
   </p:timing>
@@ -15973,7 +15955,7 @@
   <p:timing>
     <p:tnLst>
       <p:par>
-        <p:cTn xmlns:p14="http://schemas.microsoft.com/office/powerpoint/2010/main" id="1" dur="indefinite" restart="never" nodeType="tmRoot"/>
+        <p:cTn id="1" dur="indefinite" restart="never" nodeType="tmRoot"/>
       </p:par>
     </p:tnLst>
   </p:timing>
@@ -16145,7 +16127,7 @@
   <p:timing>
     <p:tnLst>
       <p:par>
-        <p:cTn xmlns:p14="http://schemas.microsoft.com/office/powerpoint/2010/main" id="1" dur="indefinite" restart="never" nodeType="tmRoot"/>
+        <p:cTn id="1" dur="indefinite" restart="never" nodeType="tmRoot"/>
       </p:par>
     </p:tnLst>
   </p:timing>
@@ -16349,7 +16331,7 @@
   <p:timing>
     <p:tnLst>
       <p:par>
-        <p:cTn xmlns:p14="http://schemas.microsoft.com/office/powerpoint/2010/main" id="1" dur="indefinite" restart="never" nodeType="tmRoot">
+        <p:cTn id="1" dur="indefinite" restart="never" nodeType="tmRoot">
           <p:childTnLst>
             <p:seq concurrent="1" nextAc="seek">
               <p:cTn id="2" dur="indefinite" nodeType="mainSeq">
@@ -16612,7 +16594,7 @@
   <p:timing>
     <p:tnLst>
       <p:par>
-        <p:cTn xmlns:p14="http://schemas.microsoft.com/office/powerpoint/2010/main" id="1" dur="indefinite" restart="never" nodeType="tmRoot"/>
+        <p:cTn id="1" dur="indefinite" restart="never" nodeType="tmRoot"/>
       </p:par>
     </p:tnLst>
   </p:timing>
@@ -17685,8 +17667,8 @@
           <a:p>
             <a:pPr algn="ctr"/>
             <a:r>
-              <a:rPr lang="en-US" dirty="0" err="1" smtClean="0"/>
-              <a:t>Django</a:t>
+              <a:rPr lang="en-US" altLang="zh-CN" dirty="0" smtClean="0"/>
+              <a:t>Flask/</a:t>
             </a:r>
             <a:endParaRPr lang="en-US" dirty="0" smtClean="0"/>
           </a:p>
@@ -17897,7 +17879,7 @@
   <p:timing>
     <p:tnLst>
       <p:par>
-        <p:cTn xmlns:p14="http://schemas.microsoft.com/office/powerpoint/2010/main" id="1" dur="indefinite" restart="never" nodeType="tmRoot">
+        <p:cTn id="1" dur="indefinite" restart="never" nodeType="tmRoot">
           <p:childTnLst>
             <p:seq concurrent="1" nextAc="seek">
               <p:cTn id="2" dur="indefinite" nodeType="mainSeq">
@@ -19497,7 +19479,7 @@
   <a:extraClrSchemeLst/>
   <a:extLst>
     <a:ext uri="{05A4C25C-085E-4340-85A3-A5531E510DB2}">
-      <thm15:themeFamily xmlns="" xmlns:thm15="http://schemas.microsoft.com/office/thememl/2012/main" name="Office Theme" id="{62F939B6-93AF-4DB8-9C6B-D6C7DFDC589F}" vid="{4A3C46E8-61CC-4603-A589-7422A47A8E4A}"/>
+      <thm15:themeFamily xmlns:thm15="http://schemas.microsoft.com/office/thememl/2012/main" name="Office Theme" id="{62F939B6-93AF-4DB8-9C6B-D6C7DFDC589F}" vid="{4A3C46E8-61CC-4603-A589-7422A47A8E4A}"/>
     </a:ext>
   </a:extLst>
 </a:theme>
@@ -19792,7 +19774,7 @@
   <a:extraClrSchemeLst/>
   <a:extLst>
     <a:ext uri="{05A4C25C-085E-4340-85A3-A5531E510DB2}">
-      <thm15:themeFamily xmlns="" xmlns:thm15="http://schemas.microsoft.com/office/thememl/2012/main" name="Office Theme" id="{62F939B6-93AF-4DB8-9C6B-D6C7DFDC589F}" vid="{4A3C46E8-61CC-4603-A589-7422A47A8E4A}"/>
+      <thm15:themeFamily xmlns:thm15="http://schemas.microsoft.com/office/thememl/2012/main" name="Office Theme" id="{62F939B6-93AF-4DB8-9C6B-D6C7DFDC589F}" vid="{4A3C46E8-61CC-4603-A589-7422A47A8E4A}"/>
     </a:ext>
   </a:extLst>
 </a:theme>
@@ -20053,7 +20035,7 @@
   <a:extraClrSchemeLst/>
   <a:extLst>
     <a:ext uri="{05A4C25C-085E-4340-85A3-A5531E510DB2}">
-      <thm15:themeFamily xmlns="" xmlns:thm15="http://schemas.microsoft.com/office/thememl/2012/main" name="Office Theme" id="{62F939B6-93AF-4DB8-9C6B-D6C7DFDC589F}" vid="{4A3C46E8-61CC-4603-A589-7422A47A8E4A}"/>
+      <thm15:themeFamily xmlns:thm15="http://schemas.microsoft.com/office/thememl/2012/main" name="Office Theme" id="{62F939B6-93AF-4DB8-9C6B-D6C7DFDC589F}" vid="{4A3C46E8-61CC-4603-A589-7422A47A8E4A}"/>
     </a:ext>
   </a:extLst>
 </a:theme>
@@ -20605,7 +20587,7 @@
   <a:extraClrSchemeLst/>
   <a:extLst>
     <a:ext uri="{05A4C25C-085E-4340-85A3-A5531E510DB2}">
-      <thm15:themeFamily xmlns="" xmlns:thm15="http://schemas.microsoft.com/office/thememl/2012/main" name="Office Theme" id="{62F939B6-93AF-4DB8-9C6B-D6C7DFDC589F}" vid="{4A3C46E8-61CC-4603-A589-7422A47A8E4A}"/>
+      <thm15:themeFamily xmlns:thm15="http://schemas.microsoft.com/office/thememl/2012/main" name="Office Theme" id="{62F939B6-93AF-4DB8-9C6B-D6C7DFDC589F}" vid="{4A3C46E8-61CC-4603-A589-7422A47A8E4A}"/>
     </a:ext>
   </a:extLst>
 </a:theme>

</xml_diff>